<commit_message>
First week pack update minor tweak
</commit_message>
<xml_diff>
--- a/WSCC Weekly C19 Pack 22nd July 2020.pptx
+++ b/WSCC Weekly C19 Pack 22nd July 2020.pptx
@@ -13,13 +13,13 @@
   <p:sldIdLst>
     <p:sldId id="256" r:id="rId5"/>
     <p:sldId id="301" r:id="rId6"/>
-    <p:sldId id="309" r:id="rId7"/>
-    <p:sldId id="310" r:id="rId8"/>
-    <p:sldId id="311" r:id="rId9"/>
-    <p:sldId id="312" r:id="rId10"/>
-    <p:sldId id="314" r:id="rId11"/>
-    <p:sldId id="313" r:id="rId12"/>
-    <p:sldId id="315" r:id="rId13"/>
+    <p:sldId id="325" r:id="rId7"/>
+    <p:sldId id="326" r:id="rId8"/>
+    <p:sldId id="327" r:id="rId9"/>
+    <p:sldId id="328" r:id="rId10"/>
+    <p:sldId id="329" r:id="rId11"/>
+    <p:sldId id="330" r:id="rId12"/>
+    <p:sldId id="331" r:id="rId13"/>
     <p:sldId id="284" r:id="rId14"/>
     <p:sldId id="316" r:id="rId15"/>
     <p:sldId id="317" r:id="rId16"/>
@@ -12099,7 +12099,7 @@
         </p:nvSpPr>
         <p:spPr>
           <a:xfrm>
-            <a:off x="5183155" y="6419664"/>
+            <a:off x="8587408" y="5870686"/>
             <a:ext cx="2882347" cy="276999"/>
           </a:xfrm>
           <a:prstGeom prst="rect">
@@ -12199,8 +12199,8 @@
         </p:blipFill>
         <p:spPr>
           <a:xfrm>
-            <a:off x="441423" y="775246"/>
-            <a:ext cx="11309154" cy="5368269"/>
+            <a:off x="893135" y="775246"/>
+            <a:ext cx="10221888" cy="4852162"/>
           </a:xfrm>
           <a:prstGeom prst="rect">
             <a:avLst/>
@@ -12222,7 +12222,7 @@
         <p:spPr>
           <a:xfrm>
             <a:off x="224874" y="5866092"/>
-            <a:ext cx="2673969" cy="830997"/>
+            <a:ext cx="5458474" cy="830997"/>
           </a:xfrm>
           <a:prstGeom prst="rect">
             <a:avLst/>
@@ -12243,7 +12243,7 @@
             </a:r>
             <a:r>
               <a:rPr lang="en-GB" sz="1200" dirty="0"/>
-              <a:t>includes NHS testing</a:t>
+              <a:t>includes NHS testing, such as tests of people being admitted to hospital or being discharged to a health/care home setting, pre-operative testing etc.</a:t>
             </a:r>
           </a:p>
           <a:p>
@@ -16025,7 +16025,7 @@
         </p:nvSpPr>
         <p:spPr>
           <a:xfrm>
-            <a:off x="5183155" y="6419664"/>
+            <a:off x="8587408" y="5870686"/>
             <a:ext cx="2882347" cy="276999"/>
           </a:xfrm>
           <a:prstGeom prst="rect">
@@ -16125,8 +16125,8 @@
         </p:blipFill>
         <p:spPr>
           <a:xfrm>
-            <a:off x="441423" y="775246"/>
-            <a:ext cx="11309153" cy="5368269"/>
+            <a:off x="893135" y="775246"/>
+            <a:ext cx="10221887" cy="4852162"/>
           </a:xfrm>
           <a:prstGeom prst="rect">
             <a:avLst/>
@@ -16148,7 +16148,7 @@
         <p:spPr>
           <a:xfrm>
             <a:off x="224874" y="5866092"/>
-            <a:ext cx="2673969" cy="830997"/>
+            <a:ext cx="5458474" cy="830997"/>
           </a:xfrm>
           <a:prstGeom prst="rect">
             <a:avLst/>
@@ -16169,7 +16169,7 @@
             </a:r>
             <a:r>
               <a:rPr lang="en-GB" sz="1200" dirty="0"/>
-              <a:t>includes NHS testing</a:t>
+              <a:t>includes NHS testing, such as tests of people being admitted to hospital or being discharged to a health/care home setting, pre-operative testing etc.</a:t>
             </a:r>
           </a:p>
           <a:p>
@@ -16193,7 +16193,7 @@
     </p:spTree>
     <p:extLst>
       <p:ext uri="{BB962C8B-B14F-4D97-AF65-F5344CB8AC3E}">
-        <p14:creationId xmlns:p14="http://schemas.microsoft.com/office/powerpoint/2010/main" val="2269711792"/>
+        <p14:creationId xmlns:p14="http://schemas.microsoft.com/office/powerpoint/2010/main" val="991188450"/>
       </p:ext>
     </p:extLst>
   </p:cSld>
@@ -16453,7 +16453,7 @@
         </p:nvSpPr>
         <p:spPr>
           <a:xfrm>
-            <a:off x="5183155" y="6419664"/>
+            <a:off x="8587408" y="5870686"/>
             <a:ext cx="2882347" cy="276999"/>
           </a:xfrm>
           <a:prstGeom prst="rect">
@@ -16553,8 +16553,8 @@
         </p:blipFill>
         <p:spPr>
           <a:xfrm>
-            <a:off x="441423" y="775246"/>
-            <a:ext cx="11309153" cy="5368269"/>
+            <a:off x="893135" y="775246"/>
+            <a:ext cx="10221887" cy="4852162"/>
           </a:xfrm>
           <a:prstGeom prst="rect">
             <a:avLst/>
@@ -16576,7 +16576,7 @@
         <p:spPr>
           <a:xfrm>
             <a:off x="224874" y="5866092"/>
-            <a:ext cx="2673969" cy="830997"/>
+            <a:ext cx="5458474" cy="830997"/>
           </a:xfrm>
           <a:prstGeom prst="rect">
             <a:avLst/>
@@ -16597,7 +16597,7 @@
             </a:r>
             <a:r>
               <a:rPr lang="en-GB" sz="1200" dirty="0"/>
-              <a:t>includes NHS testing</a:t>
+              <a:t>includes NHS testing, such as tests of people being admitted to hospital or being discharged to a health/care home setting, pre-operative testing etc.</a:t>
             </a:r>
           </a:p>
           <a:p>
@@ -16621,7 +16621,7 @@
     </p:spTree>
     <p:extLst>
       <p:ext uri="{BB962C8B-B14F-4D97-AF65-F5344CB8AC3E}">
-        <p14:creationId xmlns:p14="http://schemas.microsoft.com/office/powerpoint/2010/main" val="1153991677"/>
+        <p14:creationId xmlns:p14="http://schemas.microsoft.com/office/powerpoint/2010/main" val="2262942263"/>
       </p:ext>
     </p:extLst>
   </p:cSld>
@@ -16881,7 +16881,7 @@
         </p:nvSpPr>
         <p:spPr>
           <a:xfrm>
-            <a:off x="5183155" y="6419664"/>
+            <a:off x="8587408" y="5870686"/>
             <a:ext cx="2882347" cy="276999"/>
           </a:xfrm>
           <a:prstGeom prst="rect">
@@ -16981,8 +16981,8 @@
         </p:blipFill>
         <p:spPr>
           <a:xfrm>
-            <a:off x="441423" y="775246"/>
-            <a:ext cx="11309153" cy="5368269"/>
+            <a:off x="893135" y="775246"/>
+            <a:ext cx="10221887" cy="4852162"/>
           </a:xfrm>
           <a:prstGeom prst="rect">
             <a:avLst/>
@@ -17004,7 +17004,7 @@
         <p:spPr>
           <a:xfrm>
             <a:off x="224874" y="5866092"/>
-            <a:ext cx="2673969" cy="830997"/>
+            <a:ext cx="5458474" cy="830997"/>
           </a:xfrm>
           <a:prstGeom prst="rect">
             <a:avLst/>
@@ -17025,7 +17025,7 @@
             </a:r>
             <a:r>
               <a:rPr lang="en-GB" sz="1200" dirty="0"/>
-              <a:t>includes NHS testing</a:t>
+              <a:t>includes NHS testing, such as tests of people being admitted to hospital or being discharged to a health/care home setting, pre-operative testing etc.</a:t>
             </a:r>
           </a:p>
           <a:p>
@@ -17049,7 +17049,7 @@
     </p:spTree>
     <p:extLst>
       <p:ext uri="{BB962C8B-B14F-4D97-AF65-F5344CB8AC3E}">
-        <p14:creationId xmlns:p14="http://schemas.microsoft.com/office/powerpoint/2010/main" val="793712654"/>
+        <p14:creationId xmlns:p14="http://schemas.microsoft.com/office/powerpoint/2010/main" val="2558888260"/>
       </p:ext>
     </p:extLst>
   </p:cSld>
@@ -17309,7 +17309,7 @@
         </p:nvSpPr>
         <p:spPr>
           <a:xfrm>
-            <a:off x="5183155" y="6419664"/>
+            <a:off x="8587408" y="5870686"/>
             <a:ext cx="2882347" cy="276999"/>
           </a:xfrm>
           <a:prstGeom prst="rect">
@@ -17409,8 +17409,8 @@
         </p:blipFill>
         <p:spPr>
           <a:xfrm>
-            <a:off x="441423" y="775246"/>
-            <a:ext cx="11309153" cy="5368269"/>
+            <a:off x="893135" y="775246"/>
+            <a:ext cx="10221887" cy="4852162"/>
           </a:xfrm>
           <a:prstGeom prst="rect">
             <a:avLst/>
@@ -17432,7 +17432,7 @@
         <p:spPr>
           <a:xfrm>
             <a:off x="224874" y="5866092"/>
-            <a:ext cx="2673969" cy="830997"/>
+            <a:ext cx="5458474" cy="830997"/>
           </a:xfrm>
           <a:prstGeom prst="rect">
             <a:avLst/>
@@ -17453,7 +17453,7 @@
             </a:r>
             <a:r>
               <a:rPr lang="en-GB" sz="1200" dirty="0"/>
-              <a:t>includes NHS testing</a:t>
+              <a:t>includes NHS testing, such as tests of people being admitted to hospital or being discharged to a health/care home setting, pre-operative testing etc.</a:t>
             </a:r>
           </a:p>
           <a:p>
@@ -17477,7 +17477,7 @@
     </p:spTree>
     <p:extLst>
       <p:ext uri="{BB962C8B-B14F-4D97-AF65-F5344CB8AC3E}">
-        <p14:creationId xmlns:p14="http://schemas.microsoft.com/office/powerpoint/2010/main" val="1650957154"/>
+        <p14:creationId xmlns:p14="http://schemas.microsoft.com/office/powerpoint/2010/main" val="3699650956"/>
       </p:ext>
     </p:extLst>
   </p:cSld>
@@ -17737,7 +17737,7 @@
         </p:nvSpPr>
         <p:spPr>
           <a:xfrm>
-            <a:off x="5183155" y="6419664"/>
+            <a:off x="8587408" y="5870686"/>
             <a:ext cx="2882347" cy="276999"/>
           </a:xfrm>
           <a:prstGeom prst="rect">
@@ -17837,8 +17837,8 @@
         </p:blipFill>
         <p:spPr>
           <a:xfrm>
-            <a:off x="441423" y="775246"/>
-            <a:ext cx="11309153" cy="5368269"/>
+            <a:off x="893135" y="775246"/>
+            <a:ext cx="10221887" cy="4852162"/>
           </a:xfrm>
           <a:prstGeom prst="rect">
             <a:avLst/>
@@ -17860,7 +17860,7 @@
         <p:spPr>
           <a:xfrm>
             <a:off x="224874" y="5866092"/>
-            <a:ext cx="2673969" cy="830997"/>
+            <a:ext cx="5458474" cy="830997"/>
           </a:xfrm>
           <a:prstGeom prst="rect">
             <a:avLst/>
@@ -17881,7 +17881,7 @@
             </a:r>
             <a:r>
               <a:rPr lang="en-GB" sz="1200" dirty="0"/>
-              <a:t>includes NHS testing</a:t>
+              <a:t>includes NHS testing, such as tests of people being admitted to hospital or being discharged to a health/care home setting, pre-operative testing etc.</a:t>
             </a:r>
           </a:p>
           <a:p>
@@ -17905,7 +17905,7 @@
     </p:spTree>
     <p:extLst>
       <p:ext uri="{BB962C8B-B14F-4D97-AF65-F5344CB8AC3E}">
-        <p14:creationId xmlns:p14="http://schemas.microsoft.com/office/powerpoint/2010/main" val="2266476879"/>
+        <p14:creationId xmlns:p14="http://schemas.microsoft.com/office/powerpoint/2010/main" val="4232809412"/>
       </p:ext>
     </p:extLst>
   </p:cSld>
@@ -18165,7 +18165,7 @@
         </p:nvSpPr>
         <p:spPr>
           <a:xfrm>
-            <a:off x="5183155" y="6419664"/>
+            <a:off x="8587408" y="5870686"/>
             <a:ext cx="2882347" cy="276999"/>
           </a:xfrm>
           <a:prstGeom prst="rect">
@@ -18265,8 +18265,8 @@
         </p:blipFill>
         <p:spPr>
           <a:xfrm>
-            <a:off x="441423" y="775246"/>
-            <a:ext cx="11309153" cy="5368269"/>
+            <a:off x="893135" y="775246"/>
+            <a:ext cx="10221887" cy="4852162"/>
           </a:xfrm>
           <a:prstGeom prst="rect">
             <a:avLst/>
@@ -18288,7 +18288,7 @@
         <p:spPr>
           <a:xfrm>
             <a:off x="224874" y="5866092"/>
-            <a:ext cx="2673969" cy="830997"/>
+            <a:ext cx="5458474" cy="830997"/>
           </a:xfrm>
           <a:prstGeom prst="rect">
             <a:avLst/>
@@ -18309,7 +18309,7 @@
             </a:r>
             <a:r>
               <a:rPr lang="en-GB" sz="1200" dirty="0"/>
-              <a:t>includes NHS testing</a:t>
+              <a:t>includes NHS testing, such as tests of people being admitted to hospital or being discharged to a health/care home setting, pre-operative testing etc.</a:t>
             </a:r>
           </a:p>
           <a:p>
@@ -18333,7 +18333,7 @@
     </p:spTree>
     <p:extLst>
       <p:ext uri="{BB962C8B-B14F-4D97-AF65-F5344CB8AC3E}">
-        <p14:creationId xmlns:p14="http://schemas.microsoft.com/office/powerpoint/2010/main" val="2455059355"/>
+        <p14:creationId xmlns:p14="http://schemas.microsoft.com/office/powerpoint/2010/main" val="1202750535"/>
       </p:ext>
     </p:extLst>
   </p:cSld>
@@ -18593,7 +18593,7 @@
         </p:nvSpPr>
         <p:spPr>
           <a:xfrm>
-            <a:off x="5183155" y="6419664"/>
+            <a:off x="8587408" y="5870686"/>
             <a:ext cx="2882347" cy="276999"/>
           </a:xfrm>
           <a:prstGeom prst="rect">
@@ -18693,8 +18693,8 @@
         </p:blipFill>
         <p:spPr>
           <a:xfrm>
-            <a:off x="441423" y="775246"/>
-            <a:ext cx="11309153" cy="5368269"/>
+            <a:off x="893135" y="775246"/>
+            <a:ext cx="10221887" cy="4852162"/>
           </a:xfrm>
           <a:prstGeom prst="rect">
             <a:avLst/>
@@ -18716,7 +18716,7 @@
         <p:spPr>
           <a:xfrm>
             <a:off x="224874" y="5866092"/>
-            <a:ext cx="2673969" cy="830997"/>
+            <a:ext cx="5458474" cy="830997"/>
           </a:xfrm>
           <a:prstGeom prst="rect">
             <a:avLst/>
@@ -18737,7 +18737,7 @@
             </a:r>
             <a:r>
               <a:rPr lang="en-GB" sz="1200" dirty="0"/>
-              <a:t>includes NHS testing</a:t>
+              <a:t>includes NHS testing, such as tests of people being admitted to hospital or being discharged to a health/care home setting, pre-operative testing etc.</a:t>
             </a:r>
           </a:p>
           <a:p>
@@ -18761,7 +18761,7 @@
     </p:spTree>
     <p:extLst>
       <p:ext uri="{BB962C8B-B14F-4D97-AF65-F5344CB8AC3E}">
-        <p14:creationId xmlns:p14="http://schemas.microsoft.com/office/powerpoint/2010/main" val="1634493043"/>
+        <p14:creationId xmlns:p14="http://schemas.microsoft.com/office/powerpoint/2010/main" val="2890460249"/>
       </p:ext>
     </p:extLst>
   </p:cSld>
@@ -19657,12 +19657,6 @@
 </file>
 
 <file path=customXml/item1.xml><?xml version="1.0" encoding="utf-8"?>
-<p:properties xmlns:p="http://schemas.microsoft.com/office/2006/metadata/properties" xmlns:xsi="http://www.w3.org/2001/XMLSchema-instance" xmlns:pc="http://schemas.microsoft.com/office/infopath/2007/PartnerControls">
-  <documentManagement/>
-</p:properties>
-</file>
-
-<file path=customXml/item2.xml><?xml version="1.0" encoding="utf-8"?>
 <ct:contentTypeSchema xmlns:ct="http://schemas.microsoft.com/office/2006/metadata/contentType" xmlns:ma="http://schemas.microsoft.com/office/2006/metadata/properties/metaAttributes" ct:_="" ma:_="" ma:contentTypeName="Document" ma:contentTypeID="0x01010003E7173A116BBB4EA178B4442288DCB5" ma:contentTypeVersion="10" ma:contentTypeDescription="Create a new document." ma:contentTypeScope="" ma:versionID="8ab894609abb646d24172300b4fcfdeb">
   <xsd:schema xmlns:xsd="http://www.w3.org/2001/XMLSchema" xmlns:xs="http://www.w3.org/2001/XMLSchema" xmlns:p="http://schemas.microsoft.com/office/2006/metadata/properties" xmlns:ns3="224975ee-2a82-4127-83fc-66d22c2f747a" targetNamespace="http://schemas.microsoft.com/office/2006/metadata/properties" ma:root="true" ma:fieldsID="25b2cf82f3428938808fbc45c05782f3" ns3:_="">
     <xsd:import namespace="224975ee-2a82-4127-83fc-66d22c2f747a"/>
@@ -19846,6 +19840,12 @@
 </ct:contentTypeSchema>
 </file>
 
+<file path=customXml/item2.xml><?xml version="1.0" encoding="utf-8"?>
+<p:properties xmlns:p="http://schemas.microsoft.com/office/2006/metadata/properties" xmlns:xsi="http://www.w3.org/2001/XMLSchema-instance" xmlns:pc="http://schemas.microsoft.com/office/infopath/2007/PartnerControls">
+  <documentManagement/>
+</p:properties>
+</file>
+
 <file path=customXml/item3.xml><?xml version="1.0" encoding="utf-8"?>
 <?mso-contentType ?>
 <FormTemplates xmlns="http://schemas.microsoft.com/sharepoint/v3/contenttype/forms">
@@ -19856,22 +19856,6 @@
 </file>
 
 <file path=customXml/itemProps1.xml><?xml version="1.0" encoding="utf-8"?>
-<ds:datastoreItem xmlns:ds="http://schemas.openxmlformats.org/officeDocument/2006/customXml" ds:itemID="{6DCDAD12-EC44-4C3C-85A7-79536065DF82}">
-  <ds:schemaRefs>
-    <ds:schemaRef ds:uri="http://purl.org/dc/elements/1.1/"/>
-    <ds:schemaRef ds:uri="http://schemas.microsoft.com/office/2006/metadata/properties"/>
-    <ds:schemaRef ds:uri="http://purl.org/dc/terms/"/>
-    <ds:schemaRef ds:uri="http://schemas.openxmlformats.org/package/2006/metadata/core-properties"/>
-    <ds:schemaRef ds:uri="http://schemas.microsoft.com/office/2006/documentManagement/types"/>
-    <ds:schemaRef ds:uri="http://schemas.microsoft.com/office/infopath/2007/PartnerControls"/>
-    <ds:schemaRef ds:uri="224975ee-2a82-4127-83fc-66d22c2f747a"/>
-    <ds:schemaRef ds:uri="http://www.w3.org/XML/1998/namespace"/>
-    <ds:schemaRef ds:uri="http://purl.org/dc/dcmitype/"/>
-  </ds:schemaRefs>
-</ds:datastoreItem>
-</file>
-
-<file path=customXml/itemProps2.xml><?xml version="1.0" encoding="utf-8"?>
 <ds:datastoreItem xmlns:ds="http://schemas.openxmlformats.org/officeDocument/2006/customXml" ds:itemID="{BA9F7DE1-F5C4-4B70-807B-E6A79A83F796}">
   <ds:schemaRefs>
     <ds:schemaRef ds:uri="http://schemas.microsoft.com/office/2006/metadata/contentType"/>
@@ -19889,6 +19873,22 @@
 </ds:datastoreItem>
 </file>
 
+<file path=customXml/itemProps2.xml><?xml version="1.0" encoding="utf-8"?>
+<ds:datastoreItem xmlns:ds="http://schemas.openxmlformats.org/officeDocument/2006/customXml" ds:itemID="{6DCDAD12-EC44-4C3C-85A7-79536065DF82}">
+  <ds:schemaRefs>
+    <ds:schemaRef ds:uri="http://purl.org/dc/elements/1.1/"/>
+    <ds:schemaRef ds:uri="http://schemas.microsoft.com/office/2006/metadata/properties"/>
+    <ds:schemaRef ds:uri="http://purl.org/dc/terms/"/>
+    <ds:schemaRef ds:uri="http://schemas.openxmlformats.org/package/2006/metadata/core-properties"/>
+    <ds:schemaRef ds:uri="http://schemas.microsoft.com/office/2006/documentManagement/types"/>
+    <ds:schemaRef ds:uri="http://schemas.microsoft.com/office/infopath/2007/PartnerControls"/>
+    <ds:schemaRef ds:uri="224975ee-2a82-4127-83fc-66d22c2f747a"/>
+    <ds:schemaRef ds:uri="http://www.w3.org/XML/1998/namespace"/>
+    <ds:schemaRef ds:uri="http://purl.org/dc/dcmitype/"/>
+  </ds:schemaRefs>
+</ds:datastoreItem>
+</file>
+
 <file path=customXml/itemProps3.xml><?xml version="1.0" encoding="utf-8"?>
 <ds:datastoreItem xmlns:ds="http://schemas.openxmlformats.org/officeDocument/2006/customXml" ds:itemID="{0D2EA956-31E8-4499-9386-688848203D5D}">
   <ds:schemaRefs>

</xml_diff>